<commit_message>
Update Geschäftsvorschlag sowie grafischer Prototyp.pptx
</commit_message>
<xml_diff>
--- a/Geschäftsvorschlag sowie grafischer Prototyp.pptx
+++ b/Geschäftsvorschlag sowie grafischer Prototyp.pptx
@@ -10,16 +10,16 @@
     <p:sldId id="267" r:id="rId4"/>
     <p:sldId id="268" r:id="rId5"/>
     <p:sldId id="270" r:id="rId6"/>
-    <p:sldId id="269" r:id="rId7"/>
-    <p:sldId id="258" r:id="rId8"/>
-    <p:sldId id="265" r:id="rId9"/>
-    <p:sldId id="259" r:id="rId10"/>
-    <p:sldId id="257" r:id="rId11"/>
-    <p:sldId id="260" r:id="rId12"/>
-    <p:sldId id="261" r:id="rId13"/>
-    <p:sldId id="262" r:id="rId14"/>
-    <p:sldId id="263" r:id="rId15"/>
-    <p:sldId id="264" r:id="rId16"/>
+    <p:sldId id="271" r:id="rId7"/>
+    <p:sldId id="269" r:id="rId8"/>
+    <p:sldId id="258" r:id="rId9"/>
+    <p:sldId id="265" r:id="rId10"/>
+    <p:sldId id="259" r:id="rId11"/>
+    <p:sldId id="257" r:id="rId12"/>
+    <p:sldId id="260" r:id="rId13"/>
+    <p:sldId id="261" r:id="rId14"/>
+    <p:sldId id="262" r:id="rId15"/>
+    <p:sldId id="263" r:id="rId16"/>
   </p:sldIdLst>
   <p:sldSz cx="12192000" cy="6858000"/>
   <p:notesSz cx="6858000" cy="9144000"/>
@@ -273,7 +273,7 @@
           <a:p>
             <a:fld id="{CDFC480C-E056-472F-A6EE-2C02A5AB318A}" type="datetimeFigureOut">
               <a:rPr lang="de-DE" smtClean="0"/>
-              <a:t>01.05.2020</a:t>
+              <a:t>08.05.20</a:t>
             </a:fld>
             <a:endParaRPr lang="de-DE"/>
           </a:p>
@@ -471,7 +471,7 @@
           <a:p>
             <a:fld id="{CDFC480C-E056-472F-A6EE-2C02A5AB318A}" type="datetimeFigureOut">
               <a:rPr lang="de-DE" smtClean="0"/>
-              <a:t>01.05.2020</a:t>
+              <a:t>08.05.20</a:t>
             </a:fld>
             <a:endParaRPr lang="de-DE"/>
           </a:p>
@@ -679,7 +679,7 @@
           <a:p>
             <a:fld id="{CDFC480C-E056-472F-A6EE-2C02A5AB318A}" type="datetimeFigureOut">
               <a:rPr lang="de-DE" smtClean="0"/>
-              <a:t>01.05.2020</a:t>
+              <a:t>08.05.20</a:t>
             </a:fld>
             <a:endParaRPr lang="de-DE"/>
           </a:p>
@@ -877,7 +877,7 @@
           <a:p>
             <a:fld id="{CDFC480C-E056-472F-A6EE-2C02A5AB318A}" type="datetimeFigureOut">
               <a:rPr lang="de-DE" smtClean="0"/>
-              <a:t>01.05.2020</a:t>
+              <a:t>08.05.20</a:t>
             </a:fld>
             <a:endParaRPr lang="de-DE"/>
           </a:p>
@@ -1152,7 +1152,7 @@
           <a:p>
             <a:fld id="{CDFC480C-E056-472F-A6EE-2C02A5AB318A}" type="datetimeFigureOut">
               <a:rPr lang="de-DE" smtClean="0"/>
-              <a:t>01.05.2020</a:t>
+              <a:t>08.05.20</a:t>
             </a:fld>
             <a:endParaRPr lang="de-DE"/>
           </a:p>
@@ -1417,7 +1417,7 @@
           <a:p>
             <a:fld id="{CDFC480C-E056-472F-A6EE-2C02A5AB318A}" type="datetimeFigureOut">
               <a:rPr lang="de-DE" smtClean="0"/>
-              <a:t>01.05.2020</a:t>
+              <a:t>08.05.20</a:t>
             </a:fld>
             <a:endParaRPr lang="de-DE"/>
           </a:p>
@@ -1829,7 +1829,7 @@
           <a:p>
             <a:fld id="{CDFC480C-E056-472F-A6EE-2C02A5AB318A}" type="datetimeFigureOut">
               <a:rPr lang="de-DE" smtClean="0"/>
-              <a:t>01.05.2020</a:t>
+              <a:t>08.05.20</a:t>
             </a:fld>
             <a:endParaRPr lang="de-DE"/>
           </a:p>
@@ -1970,7 +1970,7 @@
           <a:p>
             <a:fld id="{CDFC480C-E056-472F-A6EE-2C02A5AB318A}" type="datetimeFigureOut">
               <a:rPr lang="de-DE" smtClean="0"/>
-              <a:t>01.05.2020</a:t>
+              <a:t>08.05.20</a:t>
             </a:fld>
             <a:endParaRPr lang="de-DE"/>
           </a:p>
@@ -2083,7 +2083,7 @@
           <a:p>
             <a:fld id="{CDFC480C-E056-472F-A6EE-2C02A5AB318A}" type="datetimeFigureOut">
               <a:rPr lang="de-DE" smtClean="0"/>
-              <a:t>01.05.2020</a:t>
+              <a:t>08.05.20</a:t>
             </a:fld>
             <a:endParaRPr lang="de-DE"/>
           </a:p>
@@ -2394,7 +2394,7 @@
           <a:p>
             <a:fld id="{CDFC480C-E056-472F-A6EE-2C02A5AB318A}" type="datetimeFigureOut">
               <a:rPr lang="de-DE" smtClean="0"/>
-              <a:t>01.05.2020</a:t>
+              <a:t>08.05.20</a:t>
             </a:fld>
             <a:endParaRPr lang="de-DE"/>
           </a:p>
@@ -2682,7 +2682,7 @@
           <a:p>
             <a:fld id="{CDFC480C-E056-472F-A6EE-2C02A5AB318A}" type="datetimeFigureOut">
               <a:rPr lang="de-DE" smtClean="0"/>
-              <a:t>01.05.2020</a:t>
+              <a:t>08.05.20</a:t>
             </a:fld>
             <a:endParaRPr lang="de-DE"/>
           </a:p>
@@ -2923,7 +2923,7 @@
           <a:p>
             <a:fld id="{CDFC480C-E056-472F-A6EE-2C02A5AB318A}" type="datetimeFigureOut">
               <a:rPr lang="de-DE" smtClean="0"/>
-              <a:t>01.05.2020</a:t>
+              <a:t>08.05.20</a:t>
             </a:fld>
             <a:endParaRPr lang="de-DE"/>
           </a:p>
@@ -3598,6 +3598,221 @@
       </p:grpSpPr>
       <p:pic>
         <p:nvPicPr>
+          <p:cNvPr id="7170" name="Picture 2">
+            <a:extLst>
+              <a:ext uri="{FF2B5EF4-FFF2-40B4-BE49-F238E27FC236}">
+                <a16:creationId xmlns:a16="http://schemas.microsoft.com/office/drawing/2014/main" id="{CAB2B90C-E473-4B70-8538-7EE4FBC67ADA}"/>
+              </a:ext>
+            </a:extLst>
+          </p:cNvPr>
+          <p:cNvPicPr>
+            <a:picLocks noChangeAspect="1" noChangeArrowheads="1"/>
+          </p:cNvPicPr>
+          <p:nvPr/>
+        </p:nvPicPr>
+        <p:blipFill>
+          <a:blip r:embed="rId2">
+            <a:extLst>
+              <a:ext uri="{28A0092B-C50C-407E-A947-70E740481C1C}">
+                <a14:useLocalDpi xmlns:a14="http://schemas.microsoft.com/office/drawing/2010/main" val="0"/>
+              </a:ext>
+            </a:extLst>
+          </a:blip>
+          <a:srcRect/>
+          <a:stretch>
+            <a:fillRect/>
+          </a:stretch>
+        </p:blipFill>
+        <p:spPr bwMode="auto">
+          <a:xfrm>
+            <a:off x="3080822" y="254000"/>
+            <a:ext cx="5575300" cy="6350000"/>
+          </a:xfrm>
+          <a:prstGeom prst="rect">
+            <a:avLst/>
+          </a:prstGeom>
+          <a:noFill/>
+          <a:extLst>
+            <a:ext uri="{909E8E84-426E-40DD-AFC4-6F175D3DCCD1}">
+              <a14:hiddenFill xmlns:a14="http://schemas.microsoft.com/office/drawing/2010/main">
+                <a:solidFill>
+                  <a:srgbClr val="FFFFFF"/>
+                </a:solidFill>
+              </a14:hiddenFill>
+            </a:ext>
+          </a:extLst>
+        </p:spPr>
+      </p:pic>
+      <p:sp>
+        <p:nvSpPr>
+          <p:cNvPr id="3" name="Rechteck 2">
+            <a:extLst>
+              <a:ext uri="{FF2B5EF4-FFF2-40B4-BE49-F238E27FC236}">
+                <a16:creationId xmlns:a16="http://schemas.microsoft.com/office/drawing/2014/main" id="{9D8C411A-E2A1-49E9-B6AB-29ED6E95F172}"/>
+              </a:ext>
+            </a:extLst>
+          </p:cNvPr>
+          <p:cNvSpPr/>
+          <p:nvPr/>
+        </p:nvSpPr>
+        <p:spPr>
+          <a:xfrm>
+            <a:off x="7591463" y="488462"/>
+            <a:ext cx="173121" cy="189326"/>
+          </a:xfrm>
+          <a:prstGeom prst="rect">
+            <a:avLst/>
+          </a:prstGeom>
+          <a:solidFill>
+            <a:schemeClr val="bg1"/>
+          </a:solidFill>
+          <a:ln>
+            <a:solidFill>
+              <a:schemeClr val="bg1"/>
+            </a:solidFill>
+          </a:ln>
+        </p:spPr>
+        <p:style>
+          <a:lnRef idx="2">
+            <a:schemeClr val="accent1">
+              <a:shade val="50000"/>
+            </a:schemeClr>
+          </a:lnRef>
+          <a:fillRef idx="1">
+            <a:schemeClr val="accent1"/>
+          </a:fillRef>
+          <a:effectRef idx="0">
+            <a:schemeClr val="accent1"/>
+          </a:effectRef>
+          <a:fontRef idx="minor">
+            <a:schemeClr val="lt1"/>
+          </a:fontRef>
+        </p:style>
+        <p:txBody>
+          <a:bodyPr rtlCol="0" anchor="ctr"/>
+          <a:lstStyle/>
+          <a:p>
+            <a:pPr algn="ctr"/>
+            <a:endParaRPr lang="de-DE"/>
+          </a:p>
+        </p:txBody>
+      </p:sp>
+      <p:sp>
+        <p:nvSpPr>
+          <p:cNvPr id="4" name="Rechteck 3">
+            <a:extLst>
+              <a:ext uri="{FF2B5EF4-FFF2-40B4-BE49-F238E27FC236}">
+                <a16:creationId xmlns:a16="http://schemas.microsoft.com/office/drawing/2014/main" id="{7702D70D-761D-3D4F-B566-00CE4F135FAC}"/>
+              </a:ext>
+            </a:extLst>
+          </p:cNvPr>
+          <p:cNvSpPr/>
+          <p:nvPr/>
+        </p:nvSpPr>
+        <p:spPr>
+          <a:xfrm rot="5121408">
+            <a:off x="7457532" y="716977"/>
+            <a:ext cx="173121" cy="247525"/>
+          </a:xfrm>
+          <a:prstGeom prst="rect">
+            <a:avLst/>
+          </a:prstGeom>
+          <a:solidFill>
+            <a:schemeClr val="bg1"/>
+          </a:solidFill>
+          <a:ln>
+            <a:solidFill>
+              <a:schemeClr val="bg1"/>
+            </a:solidFill>
+          </a:ln>
+        </p:spPr>
+        <p:style>
+          <a:lnRef idx="2">
+            <a:schemeClr val="accent1">
+              <a:shade val="50000"/>
+            </a:schemeClr>
+          </a:lnRef>
+          <a:fillRef idx="1">
+            <a:schemeClr val="accent1"/>
+          </a:fillRef>
+          <a:effectRef idx="0">
+            <a:schemeClr val="accent1"/>
+          </a:effectRef>
+          <a:fontRef idx="minor">
+            <a:schemeClr val="lt1"/>
+          </a:fontRef>
+        </p:style>
+        <p:txBody>
+          <a:bodyPr rtlCol="0" anchor="ctr"/>
+          <a:lstStyle/>
+          <a:p>
+            <a:pPr algn="ctr"/>
+            <a:endParaRPr lang="de-DE"/>
+          </a:p>
+        </p:txBody>
+      </p:sp>
+      <p:sp>
+        <p:nvSpPr>
+          <p:cNvPr id="5" name="Textfeld 4">
+            <a:extLst>
+              <a:ext uri="{FF2B5EF4-FFF2-40B4-BE49-F238E27FC236}">
+                <a16:creationId xmlns:a16="http://schemas.microsoft.com/office/drawing/2014/main" id="{EC56EFDC-D9A1-7F45-9DD5-1B4C210C10EA}"/>
+              </a:ext>
+            </a:extLst>
+          </p:cNvPr>
+          <p:cNvSpPr txBox="1"/>
+          <p:nvPr/>
+        </p:nvSpPr>
+        <p:spPr>
+          <a:xfrm>
+            <a:off x="415636" y="308758"/>
+            <a:ext cx="2640611" cy="369332"/>
+          </a:xfrm>
+          <a:prstGeom prst="rect">
+            <a:avLst/>
+          </a:prstGeom>
+          <a:noFill/>
+        </p:spPr>
+        <p:txBody>
+          <a:bodyPr wrap="square" rtlCol="0">
+            <a:spAutoFit/>
+          </a:bodyPr>
+          <a:lstStyle/>
+          <a:p>
+            <a:r>
+              <a:rPr lang="de-DE" dirty="0"/>
+              <a:t>Konfiguration </a:t>
+            </a:r>
+          </a:p>
+        </p:txBody>
+      </p:sp>
+    </p:spTree>
+  </p:cSld>
+  <p:clrMapOvr>
+    <a:masterClrMapping/>
+  </p:clrMapOvr>
+</p:sld>
+</file>
+
+<file path=ppt/slides/slide11.xml><?xml version="1.0" encoding="utf-8"?>
+<p:sld xmlns:a="http://schemas.openxmlformats.org/drawingml/2006/main" xmlns:r="http://schemas.openxmlformats.org/officeDocument/2006/relationships" xmlns:p="http://schemas.openxmlformats.org/presentationml/2006/main">
+  <p:cSld>
+    <p:spTree>
+      <p:nvGrpSpPr>
+        <p:cNvPr id="1" name=""/>
+        <p:cNvGrpSpPr/>
+        <p:nvPr/>
+      </p:nvGrpSpPr>
+      <p:grpSpPr>
+        <a:xfrm>
+          <a:off x="0" y="0"/>
+          <a:ext cx="0" cy="0"/>
+          <a:chOff x="0" y="0"/>
+          <a:chExt cx="0" cy="0"/>
+        </a:xfrm>
+      </p:grpSpPr>
+      <p:pic>
+        <p:nvPicPr>
           <p:cNvPr id="5122" name="Picture 2">
             <a:extLst>
               <a:ext uri="{FF2B5EF4-FFF2-40B4-BE49-F238E27FC236}">
@@ -3740,7 +3955,7 @@
 </p:sld>
 </file>
 
-<file path=ppt/slides/slide11.xml><?xml version="1.0" encoding="utf-8"?>
+<file path=ppt/slides/slide12.xml><?xml version="1.0" encoding="utf-8"?>
 <p:sld xmlns:a="http://schemas.openxmlformats.org/drawingml/2006/main" xmlns:r="http://schemas.openxmlformats.org/officeDocument/2006/relationships" xmlns:p="http://schemas.openxmlformats.org/presentationml/2006/main">
   <p:cSld>
     <p:spTree>
@@ -3893,6 +4108,42 @@
           </a:p>
         </p:txBody>
       </p:sp>
+      <p:pic>
+        <p:nvPicPr>
+          <p:cNvPr id="5" name="Grafik 4" descr="Ein Bild, das Screenshot enthält.&#10;&#10;Automatisch generierte Beschreibung">
+            <a:extLst>
+              <a:ext uri="{FF2B5EF4-FFF2-40B4-BE49-F238E27FC236}">
+                <a16:creationId xmlns:a16="http://schemas.microsoft.com/office/drawing/2014/main" id="{8BB5C1AC-2F66-C843-B7F4-3D2E6FB4F559}"/>
+              </a:ext>
+            </a:extLst>
+          </p:cNvPr>
+          <p:cNvPicPr>
+            <a:picLocks noChangeAspect="1"/>
+          </p:cNvPicPr>
+          <p:nvPr/>
+        </p:nvPicPr>
+        <p:blipFill>
+          <a:blip r:embed="rId3">
+            <a:extLst>
+              <a:ext uri="{28A0092B-C50C-407E-A947-70E740481C1C}">
+                <a14:useLocalDpi xmlns:a14="http://schemas.microsoft.com/office/drawing/2010/main" val="0"/>
+              </a:ext>
+            </a:extLst>
+          </a:blip>
+          <a:stretch>
+            <a:fillRect/>
+          </a:stretch>
+        </p:blipFill>
+        <p:spPr>
+          <a:xfrm>
+            <a:off x="4351867" y="2217797"/>
+            <a:ext cx="3244732" cy="2253286"/>
+          </a:xfrm>
+          <a:prstGeom prst="rect">
+            <a:avLst/>
+          </a:prstGeom>
+        </p:spPr>
+      </p:pic>
     </p:spTree>
   </p:cSld>
   <p:clrMapOvr>
@@ -3901,7 +4152,7 @@
 </p:sld>
 </file>
 
-<file path=ppt/slides/slide12.xml><?xml version="1.0" encoding="utf-8"?>
+<file path=ppt/slides/slide13.xml><?xml version="1.0" encoding="utf-8"?>
 <p:sld xmlns:a="http://schemas.openxmlformats.org/drawingml/2006/main" xmlns:r="http://schemas.openxmlformats.org/officeDocument/2006/relationships" xmlns:p="http://schemas.openxmlformats.org/presentationml/2006/main">
   <p:cSld>
     <p:spTree>
@@ -4062,7 +4313,7 @@
 </p:sld>
 </file>
 
-<file path=ppt/slides/slide13.xml><?xml version="1.0" encoding="utf-8"?>
+<file path=ppt/slides/slide14.xml><?xml version="1.0" encoding="utf-8"?>
 <p:sld xmlns:a="http://schemas.openxmlformats.org/drawingml/2006/main" xmlns:r="http://schemas.openxmlformats.org/officeDocument/2006/relationships" xmlns:p="http://schemas.openxmlformats.org/presentationml/2006/main">
   <p:cSld>
     <p:spTree>
@@ -4223,7 +4474,7 @@
 </p:sld>
 </file>
 
-<file path=ppt/slides/slide14.xml><?xml version="1.0" encoding="utf-8"?>
+<file path=ppt/slides/slide15.xml><?xml version="1.0" encoding="utf-8"?>
 <p:sld xmlns:a="http://schemas.openxmlformats.org/drawingml/2006/main" xmlns:r="http://schemas.openxmlformats.org/officeDocument/2006/relationships" xmlns:p="http://schemas.openxmlformats.org/presentationml/2006/main">
   <p:cSld>
     <p:spTree>
@@ -4377,86 +4628,6 @@
         </p:txBody>
       </p:sp>
     </p:spTree>
-  </p:cSld>
-  <p:clrMapOvr>
-    <a:masterClrMapping/>
-  </p:clrMapOvr>
-</p:sld>
-</file>
-
-<file path=ppt/slides/slide15.xml><?xml version="1.0" encoding="utf-8"?>
-<p:sld xmlns:a="http://schemas.openxmlformats.org/drawingml/2006/main" xmlns:r="http://schemas.openxmlformats.org/officeDocument/2006/relationships" xmlns:p="http://schemas.openxmlformats.org/presentationml/2006/main">
-  <p:cSld>
-    <p:spTree>
-      <p:nvGrpSpPr>
-        <p:cNvPr id="1" name=""/>
-        <p:cNvGrpSpPr/>
-        <p:nvPr/>
-      </p:nvGrpSpPr>
-      <p:grpSpPr>
-        <a:xfrm>
-          <a:off x="0" y="0"/>
-          <a:ext cx="0" cy="0"/>
-          <a:chOff x="0" y="0"/>
-          <a:chExt cx="0" cy="0"/>
-        </a:xfrm>
-      </p:grpSpPr>
-      <p:sp>
-        <p:nvSpPr>
-          <p:cNvPr id="2" name="Titel 1">
-            <a:extLst>
-              <a:ext uri="{FF2B5EF4-FFF2-40B4-BE49-F238E27FC236}">
-                <a16:creationId xmlns:a16="http://schemas.microsoft.com/office/drawing/2014/main" id="{09F306DB-7996-4377-9D9F-DFD719EE9789}"/>
-              </a:ext>
-            </a:extLst>
-          </p:cNvPr>
-          <p:cNvSpPr>
-            <a:spLocks noGrp="1"/>
-          </p:cNvSpPr>
-          <p:nvPr>
-            <p:ph type="title"/>
-          </p:nvPr>
-        </p:nvSpPr>
-        <p:spPr/>
-        <p:txBody>
-          <a:bodyPr/>
-          <a:lstStyle/>
-          <a:p>
-            <a:endParaRPr lang="de-DE"/>
-          </a:p>
-        </p:txBody>
-      </p:sp>
-      <p:sp>
-        <p:nvSpPr>
-          <p:cNvPr id="3" name="Inhaltsplatzhalter 2">
-            <a:extLst>
-              <a:ext uri="{FF2B5EF4-FFF2-40B4-BE49-F238E27FC236}">
-                <a16:creationId xmlns:a16="http://schemas.microsoft.com/office/drawing/2014/main" id="{B12CDCAB-EF36-4249-A8A3-D42008CD3DC7}"/>
-              </a:ext>
-            </a:extLst>
-          </p:cNvPr>
-          <p:cNvSpPr>
-            <a:spLocks noGrp="1"/>
-          </p:cNvSpPr>
-          <p:nvPr>
-            <p:ph idx="1"/>
-          </p:nvPr>
-        </p:nvSpPr>
-        <p:spPr/>
-        <p:txBody>
-          <a:bodyPr/>
-          <a:lstStyle/>
-          <a:p>
-            <a:endParaRPr lang="de-DE"/>
-          </a:p>
-        </p:txBody>
-      </p:sp>
-    </p:spTree>
-    <p:extLst>
-      <p:ext uri="{BB962C8B-B14F-4D97-AF65-F5344CB8AC3E}">
-        <p14:creationId xmlns:p14="http://schemas.microsoft.com/office/powerpoint/2010/main" val="1054938674"/>
-      </p:ext>
-    </p:extLst>
   </p:cSld>
   <p:clrMapOvr>
     <a:masterClrMapping/>
@@ -4896,6 +5067,140 @@
           <p:cNvPr id="2" name="Titel 1">
             <a:extLst>
               <a:ext uri="{FF2B5EF4-FFF2-40B4-BE49-F238E27FC236}">
+                <a16:creationId xmlns:a16="http://schemas.microsoft.com/office/drawing/2014/main" id="{3664F752-8A4F-B841-9E81-206744F4A8CC}"/>
+              </a:ext>
+            </a:extLst>
+          </p:cNvPr>
+          <p:cNvSpPr>
+            <a:spLocks noGrp="1"/>
+          </p:cNvSpPr>
+          <p:nvPr>
+            <p:ph type="title"/>
+          </p:nvPr>
+        </p:nvSpPr>
+        <p:spPr/>
+        <p:txBody>
+          <a:bodyPr/>
+          <a:lstStyle/>
+          <a:p>
+            <a:pPr algn="ctr"/>
+            <a:r>
+              <a:rPr lang="de-DE" dirty="0"/>
+              <a:t>Realisierbarkeit</a:t>
+            </a:r>
+          </a:p>
+        </p:txBody>
+      </p:sp>
+      <p:sp>
+        <p:nvSpPr>
+          <p:cNvPr id="3" name="Inhaltsplatzhalter 2">
+            <a:extLst>
+              <a:ext uri="{FF2B5EF4-FFF2-40B4-BE49-F238E27FC236}">
+                <a16:creationId xmlns:a16="http://schemas.microsoft.com/office/drawing/2014/main" id="{55DB8EBE-BACB-A040-8999-52BF67D30B7B}"/>
+              </a:ext>
+            </a:extLst>
+          </p:cNvPr>
+          <p:cNvSpPr>
+            <a:spLocks noGrp="1"/>
+          </p:cNvSpPr>
+          <p:nvPr>
+            <p:ph idx="1"/>
+          </p:nvPr>
+        </p:nvSpPr>
+        <p:spPr/>
+        <p:txBody>
+          <a:bodyPr/>
+          <a:lstStyle/>
+          <a:p>
+            <a:pPr marL="0" indent="0">
+              <a:buNone/>
+            </a:pPr>
+            <a:r>
+              <a:rPr lang="de-DE" dirty="0"/>
+              <a:t>Das GANTT-Diagramm ist eine Abschätzung des Arbeitsaufwandes des Projekts und ist im Vorfeld relativ knapp bemessen.</a:t>
+            </a:r>
+          </a:p>
+          <a:p>
+            <a:pPr marL="0" indent="0">
+              <a:buNone/>
+            </a:pPr>
+            <a:r>
+              <a:rPr lang="de-DE" dirty="0"/>
+              <a:t>Dabei ist die Umsetzung des Mock-</a:t>
+            </a:r>
+            <a:r>
+              <a:rPr lang="de-DE" dirty="0" err="1"/>
+              <a:t>Ups</a:t>
+            </a:r>
+            <a:r>
+              <a:rPr lang="de-DE" dirty="0"/>
+              <a:t> in HTML/CSS sowie die anschließende Anbindung an die Datenbank relativ schwierig abzuschätzen.</a:t>
+            </a:r>
+          </a:p>
+          <a:p>
+            <a:pPr marL="0" indent="0">
+              <a:buNone/>
+            </a:pPr>
+            <a:r>
+              <a:rPr lang="de-DE" dirty="0"/>
+              <a:t>Hierbei können Abweichungen durch Probleme bei der Umsetzung einzelner Funktionen auftreten und somit das gesamte Projekt verzögern.</a:t>
+            </a:r>
+          </a:p>
+          <a:p>
+            <a:pPr marL="0" indent="0">
+              <a:buNone/>
+            </a:pPr>
+            <a:endParaRPr lang="de-DE" dirty="0"/>
+          </a:p>
+          <a:p>
+            <a:pPr marL="0" indent="0">
+              <a:buNone/>
+            </a:pPr>
+            <a:endParaRPr lang="de-DE" dirty="0"/>
+          </a:p>
+          <a:p>
+            <a:pPr marL="0" indent="0">
+              <a:buNone/>
+            </a:pPr>
+            <a:endParaRPr lang="de-DE" dirty="0"/>
+          </a:p>
+        </p:txBody>
+      </p:sp>
+    </p:spTree>
+    <p:extLst>
+      <p:ext uri="{BB962C8B-B14F-4D97-AF65-F5344CB8AC3E}">
+        <p14:creationId xmlns:p14="http://schemas.microsoft.com/office/powerpoint/2010/main" val="3420983931"/>
+      </p:ext>
+    </p:extLst>
+  </p:cSld>
+  <p:clrMapOvr>
+    <a:masterClrMapping/>
+  </p:clrMapOvr>
+</p:sld>
+</file>
+
+<file path=ppt/slides/slide7.xml><?xml version="1.0" encoding="utf-8"?>
+<p:sld xmlns:a="http://schemas.openxmlformats.org/drawingml/2006/main" xmlns:r="http://schemas.openxmlformats.org/officeDocument/2006/relationships" xmlns:p="http://schemas.openxmlformats.org/presentationml/2006/main">
+  <p:cSld>
+    <p:spTree>
+      <p:nvGrpSpPr>
+        <p:cNvPr id="1" name=""/>
+        <p:cNvGrpSpPr/>
+        <p:nvPr/>
+      </p:nvGrpSpPr>
+      <p:grpSpPr>
+        <a:xfrm>
+          <a:off x="0" y="0"/>
+          <a:ext cx="0" cy="0"/>
+          <a:chOff x="0" y="0"/>
+          <a:chExt cx="0" cy="0"/>
+        </a:xfrm>
+      </p:grpSpPr>
+      <p:sp>
+        <p:nvSpPr>
+          <p:cNvPr id="2" name="Titel 1">
+            <a:extLst>
+              <a:ext uri="{FF2B5EF4-FFF2-40B4-BE49-F238E27FC236}">
                 <a16:creationId xmlns:a16="http://schemas.microsoft.com/office/drawing/2014/main" id="{172CE1E8-D067-C443-85F4-F9C35751CF20}"/>
               </a:ext>
             </a:extLst>
@@ -4943,7 +5248,7 @@
 </p:sld>
 </file>
 
-<file path=ppt/slides/slide7.xml><?xml version="1.0" encoding="utf-8"?>
+<file path=ppt/slides/slide8.xml><?xml version="1.0" encoding="utf-8"?>
 <p:sld xmlns:a="http://schemas.openxmlformats.org/drawingml/2006/main" xmlns:r="http://schemas.openxmlformats.org/officeDocument/2006/relationships" xmlns:p="http://schemas.openxmlformats.org/presentationml/2006/main">
   <p:cSld>
     <p:spTree>
@@ -5104,7 +5409,7 @@
 </p:sld>
 </file>
 
-<file path=ppt/slides/slide8.xml><?xml version="1.0" encoding="utf-8"?>
+<file path=ppt/slides/slide9.xml><?xml version="1.0" encoding="utf-8"?>
 <p:sld xmlns:a="http://schemas.openxmlformats.org/drawingml/2006/main" xmlns:r="http://schemas.openxmlformats.org/officeDocument/2006/relationships" xmlns:p="http://schemas.openxmlformats.org/presentationml/2006/main">
   <p:cSld>
     <p:spTree>
@@ -5388,225 +5693,6 @@
         <p14:creationId xmlns:p14="http://schemas.microsoft.com/office/powerpoint/2010/main" val="2367280945"/>
       </p:ext>
     </p:extLst>
-  </p:cSld>
-  <p:clrMapOvr>
-    <a:masterClrMapping/>
-  </p:clrMapOvr>
-</p:sld>
-</file>
-
-<file path=ppt/slides/slide9.xml><?xml version="1.0" encoding="utf-8"?>
-<p:sld xmlns:a="http://schemas.openxmlformats.org/drawingml/2006/main" xmlns:r="http://schemas.openxmlformats.org/officeDocument/2006/relationships" xmlns:p="http://schemas.openxmlformats.org/presentationml/2006/main">
-  <p:cSld>
-    <p:spTree>
-      <p:nvGrpSpPr>
-        <p:cNvPr id="1" name=""/>
-        <p:cNvGrpSpPr/>
-        <p:nvPr/>
-      </p:nvGrpSpPr>
-      <p:grpSpPr>
-        <a:xfrm>
-          <a:off x="0" y="0"/>
-          <a:ext cx="0" cy="0"/>
-          <a:chOff x="0" y="0"/>
-          <a:chExt cx="0" cy="0"/>
-        </a:xfrm>
-      </p:grpSpPr>
-      <p:pic>
-        <p:nvPicPr>
-          <p:cNvPr id="7170" name="Picture 2">
-            <a:extLst>
-              <a:ext uri="{FF2B5EF4-FFF2-40B4-BE49-F238E27FC236}">
-                <a16:creationId xmlns:a16="http://schemas.microsoft.com/office/drawing/2014/main" id="{CAB2B90C-E473-4B70-8538-7EE4FBC67ADA}"/>
-              </a:ext>
-            </a:extLst>
-          </p:cNvPr>
-          <p:cNvPicPr>
-            <a:picLocks noChangeAspect="1" noChangeArrowheads="1"/>
-          </p:cNvPicPr>
-          <p:nvPr/>
-        </p:nvPicPr>
-        <p:blipFill>
-          <a:blip r:embed="rId2">
-            <a:extLst>
-              <a:ext uri="{28A0092B-C50C-407E-A947-70E740481C1C}">
-                <a14:useLocalDpi xmlns:a14="http://schemas.microsoft.com/office/drawing/2010/main" val="0"/>
-              </a:ext>
-            </a:extLst>
-          </a:blip>
-          <a:srcRect/>
-          <a:stretch>
-            <a:fillRect/>
-          </a:stretch>
-        </p:blipFill>
-        <p:spPr bwMode="auto">
-          <a:xfrm>
-            <a:off x="3080822" y="254000"/>
-            <a:ext cx="5575300" cy="6350000"/>
-          </a:xfrm>
-          <a:prstGeom prst="rect">
-            <a:avLst/>
-          </a:prstGeom>
-          <a:noFill/>
-          <a:extLst>
-            <a:ext uri="{909E8E84-426E-40DD-AFC4-6F175D3DCCD1}">
-              <a14:hiddenFill xmlns:a14="http://schemas.microsoft.com/office/drawing/2010/main">
-                <a:solidFill>
-                  <a:srgbClr val="FFFFFF"/>
-                </a:solidFill>
-              </a14:hiddenFill>
-            </a:ext>
-          </a:extLst>
-        </p:spPr>
-      </p:pic>
-      <p:sp>
-        <p:nvSpPr>
-          <p:cNvPr id="3" name="Rechteck 2">
-            <a:extLst>
-              <a:ext uri="{FF2B5EF4-FFF2-40B4-BE49-F238E27FC236}">
-                <a16:creationId xmlns:a16="http://schemas.microsoft.com/office/drawing/2014/main" id="{9D8C411A-E2A1-49E9-B6AB-29ED6E95F172}"/>
-              </a:ext>
-            </a:extLst>
-          </p:cNvPr>
-          <p:cNvSpPr/>
-          <p:nvPr/>
-        </p:nvSpPr>
-        <p:spPr>
-          <a:xfrm>
-            <a:off x="7591463" y="488462"/>
-            <a:ext cx="173121" cy="189326"/>
-          </a:xfrm>
-          <a:prstGeom prst="rect">
-            <a:avLst/>
-          </a:prstGeom>
-          <a:solidFill>
-            <a:schemeClr val="bg1"/>
-          </a:solidFill>
-          <a:ln>
-            <a:solidFill>
-              <a:schemeClr val="bg1"/>
-            </a:solidFill>
-          </a:ln>
-        </p:spPr>
-        <p:style>
-          <a:lnRef idx="2">
-            <a:schemeClr val="accent1">
-              <a:shade val="50000"/>
-            </a:schemeClr>
-          </a:lnRef>
-          <a:fillRef idx="1">
-            <a:schemeClr val="accent1"/>
-          </a:fillRef>
-          <a:effectRef idx="0">
-            <a:schemeClr val="accent1"/>
-          </a:effectRef>
-          <a:fontRef idx="minor">
-            <a:schemeClr val="lt1"/>
-          </a:fontRef>
-        </p:style>
-        <p:txBody>
-          <a:bodyPr rtlCol="0" anchor="ctr"/>
-          <a:lstStyle/>
-          <a:p>
-            <a:pPr algn="ctr"/>
-            <a:endParaRPr lang="de-DE"/>
-          </a:p>
-        </p:txBody>
-      </p:sp>
-      <p:sp>
-        <p:nvSpPr>
-          <p:cNvPr id="4" name="Rechteck 3">
-            <a:extLst>
-              <a:ext uri="{FF2B5EF4-FFF2-40B4-BE49-F238E27FC236}">
-                <a16:creationId xmlns:a16="http://schemas.microsoft.com/office/drawing/2014/main" id="{7702D70D-761D-3D4F-B566-00CE4F135FAC}"/>
-              </a:ext>
-            </a:extLst>
-          </p:cNvPr>
-          <p:cNvSpPr/>
-          <p:nvPr/>
-        </p:nvSpPr>
-        <p:spPr>
-          <a:xfrm rot="5121408">
-            <a:off x="7457532" y="716977"/>
-            <a:ext cx="173121" cy="247525"/>
-          </a:xfrm>
-          <a:prstGeom prst="rect">
-            <a:avLst/>
-          </a:prstGeom>
-          <a:solidFill>
-            <a:schemeClr val="bg1"/>
-          </a:solidFill>
-          <a:ln>
-            <a:solidFill>
-              <a:schemeClr val="bg1"/>
-            </a:solidFill>
-          </a:ln>
-        </p:spPr>
-        <p:style>
-          <a:lnRef idx="2">
-            <a:schemeClr val="accent1">
-              <a:shade val="50000"/>
-            </a:schemeClr>
-          </a:lnRef>
-          <a:fillRef idx="1">
-            <a:schemeClr val="accent1"/>
-          </a:fillRef>
-          <a:effectRef idx="0">
-            <a:schemeClr val="accent1"/>
-          </a:effectRef>
-          <a:fontRef idx="minor">
-            <a:schemeClr val="lt1"/>
-          </a:fontRef>
-        </p:style>
-        <p:txBody>
-          <a:bodyPr rtlCol="0" anchor="ctr"/>
-          <a:lstStyle/>
-          <a:p>
-            <a:pPr algn="ctr"/>
-            <a:endParaRPr lang="de-DE"/>
-          </a:p>
-        </p:txBody>
-      </p:sp>
-      <p:sp>
-        <p:nvSpPr>
-          <p:cNvPr id="5" name="Textfeld 4">
-            <a:extLst>
-              <a:ext uri="{FF2B5EF4-FFF2-40B4-BE49-F238E27FC236}">
-                <a16:creationId xmlns:a16="http://schemas.microsoft.com/office/drawing/2014/main" id="{EC56EFDC-D9A1-7F45-9DD5-1B4C210C10EA}"/>
-              </a:ext>
-            </a:extLst>
-          </p:cNvPr>
-          <p:cNvSpPr txBox="1"/>
-          <p:nvPr/>
-        </p:nvSpPr>
-        <p:spPr>
-          <a:xfrm>
-            <a:off x="415636" y="308758"/>
-            <a:ext cx="2640611" cy="369332"/>
-          </a:xfrm>
-          <a:prstGeom prst="rect">
-            <a:avLst/>
-          </a:prstGeom>
-          <a:noFill/>
-        </p:spPr>
-        <p:txBody>
-          <a:bodyPr wrap="square" rtlCol="0">
-            <a:spAutoFit/>
-          </a:bodyPr>
-          <a:lstStyle/>
-          <a:p>
-            <a:r>
-              <a:rPr lang="de-DE" dirty="0" err="1"/>
-              <a:t>Konfiguartion</a:t>
-            </a:r>
-            <a:r>
-              <a:rPr lang="de-DE" dirty="0"/>
-              <a:t> </a:t>
-            </a:r>
-          </a:p>
-        </p:txBody>
-      </p:sp>
-    </p:spTree>
   </p:cSld>
   <p:clrMapOvr>
     <a:masterClrMapping/>

</xml_diff>